<commit_message>
Rev to Week 4 and 5 remove numbered steps
</commit_message>
<xml_diff>
--- a/Week04-Tours/Homework/lisa_fleischmann_week4_homework/Lisa_Fleischmann_Wink_Tour_Rev3.pptx
+++ b/Week04-Tours/Homework/lisa_fleischmann_week4_homework/Lisa_Fleischmann_Wink_Tour_Rev3.pptx
@@ -247,7 +247,7 @@
           <a:p>
             <a:fld id="{D8862F2C-12C1-455F-815A-C164D68E1F7B}" type="datetimeFigureOut">
               <a:rPr lang="en-US" smtClean="0"/>
-              <a:t>2/20/2020</a:t>
+              <a:t>4/3/2020</a:t>
             </a:fld>
             <a:endParaRPr lang="en-US"/>
           </a:p>
@@ -445,7 +445,7 @@
           <a:p>
             <a:fld id="{D8862F2C-12C1-455F-815A-C164D68E1F7B}" type="datetimeFigureOut">
               <a:rPr lang="en-US" smtClean="0"/>
-              <a:t>2/20/2020</a:t>
+              <a:t>4/3/2020</a:t>
             </a:fld>
             <a:endParaRPr lang="en-US"/>
           </a:p>
@@ -623,7 +623,7 @@
           <a:p>
             <a:fld id="{D8862F2C-12C1-455F-815A-C164D68E1F7B}" type="datetimeFigureOut">
               <a:rPr lang="en-US" smtClean="0"/>
-              <a:t>2/20/2020</a:t>
+              <a:t>4/3/2020</a:t>
             </a:fld>
             <a:endParaRPr lang="en-US"/>
           </a:p>
@@ -813,7 +813,7 @@
           <a:p>
             <a:fld id="{D8862F2C-12C1-455F-815A-C164D68E1F7B}" type="datetimeFigureOut">
               <a:rPr lang="en-US" smtClean="0"/>
-              <a:t>2/20/2020</a:t>
+              <a:t>4/3/2020</a:t>
             </a:fld>
             <a:endParaRPr lang="en-US"/>
           </a:p>
@@ -981,7 +981,7 @@
           <a:p>
             <a:fld id="{D8862F2C-12C1-455F-815A-C164D68E1F7B}" type="datetimeFigureOut">
               <a:rPr lang="en-US" smtClean="0"/>
-              <a:t>2/20/2020</a:t>
+              <a:t>4/3/2020</a:t>
             </a:fld>
             <a:endParaRPr lang="en-US"/>
           </a:p>
@@ -1226,7 +1226,7 @@
           <a:p>
             <a:fld id="{D8862F2C-12C1-455F-815A-C164D68E1F7B}" type="datetimeFigureOut">
               <a:rPr lang="en-US" smtClean="0"/>
-              <a:t>2/20/2020</a:t>
+              <a:t>4/3/2020</a:t>
             </a:fld>
             <a:endParaRPr lang="en-US"/>
           </a:p>
@@ -1455,7 +1455,7 @@
           <a:p>
             <a:fld id="{D8862F2C-12C1-455F-815A-C164D68E1F7B}" type="datetimeFigureOut">
               <a:rPr lang="en-US" smtClean="0"/>
-              <a:t>2/20/2020</a:t>
+              <a:t>4/3/2020</a:t>
             </a:fld>
             <a:endParaRPr lang="en-US"/>
           </a:p>
@@ -1819,7 +1819,7 @@
           <a:p>
             <a:fld id="{D8862F2C-12C1-455F-815A-C164D68E1F7B}" type="datetimeFigureOut">
               <a:rPr lang="en-US" smtClean="0"/>
-              <a:t>2/20/2020</a:t>
+              <a:t>4/3/2020</a:t>
             </a:fld>
             <a:endParaRPr lang="en-US"/>
           </a:p>
@@ -1936,7 +1936,7 @@
           <a:p>
             <a:fld id="{D8862F2C-12C1-455F-815A-C164D68E1F7B}" type="datetimeFigureOut">
               <a:rPr lang="en-US" smtClean="0"/>
-              <a:t>2/20/2020</a:t>
+              <a:t>4/3/2020</a:t>
             </a:fld>
             <a:endParaRPr lang="en-US"/>
           </a:p>
@@ -2031,7 +2031,7 @@
           <a:p>
             <a:fld id="{D8862F2C-12C1-455F-815A-C164D68E1F7B}" type="datetimeFigureOut">
               <a:rPr lang="en-US" smtClean="0"/>
-              <a:t>2/20/2020</a:t>
+              <a:t>4/3/2020</a:t>
             </a:fld>
             <a:endParaRPr lang="en-US"/>
           </a:p>
@@ -2306,7 +2306,7 @@
           <a:p>
             <a:fld id="{D8862F2C-12C1-455F-815A-C164D68E1F7B}" type="datetimeFigureOut">
               <a:rPr lang="en-US" smtClean="0"/>
-              <a:t>2/20/2020</a:t>
+              <a:t>4/3/2020</a:t>
             </a:fld>
             <a:endParaRPr lang="en-US"/>
           </a:p>
@@ -2474,7 +2474,7 @@
           <a:p>
             <a:fld id="{D8862F2C-12C1-455F-815A-C164D68E1F7B}" type="datetimeFigureOut">
               <a:rPr lang="en-US" smtClean="0"/>
-              <a:t>2/20/2020</a:t>
+              <a:t>4/3/2020</a:t>
             </a:fld>
             <a:endParaRPr lang="en-US"/>
           </a:p>
@@ -2726,7 +2726,7 @@
           <a:p>
             <a:fld id="{D8862F2C-12C1-455F-815A-C164D68E1F7B}" type="datetimeFigureOut">
               <a:rPr lang="en-US" smtClean="0"/>
-              <a:t>2/20/2020</a:t>
+              <a:t>4/3/2020</a:t>
             </a:fld>
             <a:endParaRPr lang="en-US"/>
           </a:p>
@@ -2894,7 +2894,7 @@
           <a:p>
             <a:fld id="{D8862F2C-12C1-455F-815A-C164D68E1F7B}" type="datetimeFigureOut">
               <a:rPr lang="en-US" smtClean="0"/>
-              <a:t>2/20/2020</a:t>
+              <a:t>4/3/2020</a:t>
             </a:fld>
             <a:endParaRPr lang="en-US"/>
           </a:p>
@@ -3072,7 +3072,7 @@
           <a:p>
             <a:fld id="{D8862F2C-12C1-455F-815A-C164D68E1F7B}" type="datetimeFigureOut">
               <a:rPr lang="en-US" smtClean="0"/>
-              <a:t>2/20/2020</a:t>
+              <a:t>4/3/2020</a:t>
             </a:fld>
             <a:endParaRPr lang="en-US"/>
           </a:p>
@@ -3317,7 +3317,7 @@
           <a:p>
             <a:fld id="{D8862F2C-12C1-455F-815A-C164D68E1F7B}" type="datetimeFigureOut">
               <a:rPr lang="en-US" smtClean="0"/>
-              <a:t>2/20/2020</a:t>
+              <a:t>4/3/2020</a:t>
             </a:fld>
             <a:endParaRPr lang="en-US"/>
           </a:p>
@@ -3546,7 +3546,7 @@
           <a:p>
             <a:fld id="{D8862F2C-12C1-455F-815A-C164D68E1F7B}" type="datetimeFigureOut">
               <a:rPr lang="en-US" smtClean="0"/>
-              <a:t>2/20/2020</a:t>
+              <a:t>4/3/2020</a:t>
             </a:fld>
             <a:endParaRPr lang="en-US"/>
           </a:p>
@@ -3910,7 +3910,7 @@
           <a:p>
             <a:fld id="{D8862F2C-12C1-455F-815A-C164D68E1F7B}" type="datetimeFigureOut">
               <a:rPr lang="en-US" smtClean="0"/>
-              <a:t>2/20/2020</a:t>
+              <a:t>4/3/2020</a:t>
             </a:fld>
             <a:endParaRPr lang="en-US"/>
           </a:p>
@@ -4027,7 +4027,7 @@
           <a:p>
             <a:fld id="{D8862F2C-12C1-455F-815A-C164D68E1F7B}" type="datetimeFigureOut">
               <a:rPr lang="en-US" smtClean="0"/>
-              <a:t>2/20/2020</a:t>
+              <a:t>4/3/2020</a:t>
             </a:fld>
             <a:endParaRPr lang="en-US"/>
           </a:p>
@@ -4122,7 +4122,7 @@
           <a:p>
             <a:fld id="{D8862F2C-12C1-455F-815A-C164D68E1F7B}" type="datetimeFigureOut">
               <a:rPr lang="en-US" smtClean="0"/>
-              <a:t>2/20/2020</a:t>
+              <a:t>4/3/2020</a:t>
             </a:fld>
             <a:endParaRPr lang="en-US"/>
           </a:p>
@@ -4397,7 +4397,7 @@
           <a:p>
             <a:fld id="{D8862F2C-12C1-455F-815A-C164D68E1F7B}" type="datetimeFigureOut">
               <a:rPr lang="en-US" smtClean="0"/>
-              <a:t>2/20/2020</a:t>
+              <a:t>4/3/2020</a:t>
             </a:fld>
             <a:endParaRPr lang="en-US"/>
           </a:p>
@@ -4649,7 +4649,7 @@
           <a:p>
             <a:fld id="{D8862F2C-12C1-455F-815A-C164D68E1F7B}" type="datetimeFigureOut">
               <a:rPr lang="en-US" smtClean="0"/>
-              <a:t>2/20/2020</a:t>
+              <a:t>4/3/2020</a:t>
             </a:fld>
             <a:endParaRPr lang="en-US"/>
           </a:p>
@@ -4860,7 +4860,7 @@
           <a:p>
             <a:fld id="{D8862F2C-12C1-455F-815A-C164D68E1F7B}" type="datetimeFigureOut">
               <a:rPr lang="en-US" smtClean="0"/>
-              <a:t>2/20/2020</a:t>
+              <a:t>4/3/2020</a:t>
             </a:fld>
             <a:endParaRPr lang="en-US"/>
           </a:p>
@@ -5428,7 +5428,7 @@
           <a:p>
             <a:fld id="{D8862F2C-12C1-455F-815A-C164D68E1F7B}" type="datetimeFigureOut">
               <a:rPr lang="en-US" smtClean="0"/>
-              <a:t>2/20/2020</a:t>
+              <a:t>4/3/2020</a:t>
             </a:fld>
             <a:endParaRPr lang="en-US"/>
           </a:p>
@@ -6509,58 +6509,6 @@
           </a:p>
         </p:txBody>
       </p:sp>
-      <p:sp>
-        <p:nvSpPr>
-          <p:cNvPr id="10" name="Oval 9">
-            <a:extLst>
-              <a:ext uri="{FF2B5EF4-FFF2-40B4-BE49-F238E27FC236}">
-                <a16:creationId xmlns:a16="http://schemas.microsoft.com/office/drawing/2014/main" id="{F56FC67C-9372-45F8-96BF-0F45F6B9B563}"/>
-              </a:ext>
-            </a:extLst>
-          </p:cNvPr>
-          <p:cNvSpPr/>
-          <p:nvPr/>
-        </p:nvSpPr>
-        <p:spPr>
-          <a:xfrm>
-            <a:off x="3688720" y="-14068"/>
-            <a:ext cx="287919" cy="298579"/>
-          </a:xfrm>
-          <a:prstGeom prst="ellipse">
-            <a:avLst/>
-          </a:prstGeom>
-          <a:solidFill>
-            <a:srgbClr val="FF0000"/>
-          </a:solidFill>
-        </p:spPr>
-        <p:style>
-          <a:lnRef idx="2">
-            <a:schemeClr val="accent1">
-              <a:shade val="50000"/>
-            </a:schemeClr>
-          </a:lnRef>
-          <a:fillRef idx="1">
-            <a:schemeClr val="accent1"/>
-          </a:fillRef>
-          <a:effectRef idx="0">
-            <a:schemeClr val="accent1"/>
-          </a:effectRef>
-          <a:fontRef idx="minor">
-            <a:schemeClr val="lt1"/>
-          </a:fontRef>
-        </p:style>
-        <p:txBody>
-          <a:bodyPr rtlCol="0" anchor="ctr"/>
-          <a:lstStyle/>
-          <a:p>
-            <a:pPr algn="ctr"/>
-            <a:r>
-              <a:rPr lang="en-US" dirty="0"/>
-              <a:t>1</a:t>
-            </a:r>
-          </a:p>
-        </p:txBody>
-      </p:sp>
     </p:spTree>
     <p:extLst>
       <p:ext uri="{BB962C8B-B14F-4D97-AF65-F5344CB8AC3E}">
@@ -6831,58 +6779,6 @@
           </a:p>
         </p:txBody>
       </p:sp>
-      <p:sp>
-        <p:nvSpPr>
-          <p:cNvPr id="8" name="Oval 7">
-            <a:extLst>
-              <a:ext uri="{FF2B5EF4-FFF2-40B4-BE49-F238E27FC236}">
-                <a16:creationId xmlns:a16="http://schemas.microsoft.com/office/drawing/2014/main" id="{124236BD-CF00-4D02-8D2F-4F14A67E19D2}"/>
-              </a:ext>
-            </a:extLst>
-          </p:cNvPr>
-          <p:cNvSpPr/>
-          <p:nvPr/>
-        </p:nvSpPr>
-        <p:spPr>
-          <a:xfrm>
-            <a:off x="570374" y="1464906"/>
-            <a:ext cx="287919" cy="298579"/>
-          </a:xfrm>
-          <a:prstGeom prst="ellipse">
-            <a:avLst/>
-          </a:prstGeom>
-          <a:solidFill>
-            <a:srgbClr val="FF0000"/>
-          </a:solidFill>
-        </p:spPr>
-        <p:style>
-          <a:lnRef idx="2">
-            <a:schemeClr val="accent1">
-              <a:shade val="50000"/>
-            </a:schemeClr>
-          </a:lnRef>
-          <a:fillRef idx="1">
-            <a:schemeClr val="accent1"/>
-          </a:fillRef>
-          <a:effectRef idx="0">
-            <a:schemeClr val="accent1"/>
-          </a:effectRef>
-          <a:fontRef idx="minor">
-            <a:schemeClr val="lt1"/>
-          </a:fontRef>
-        </p:style>
-        <p:txBody>
-          <a:bodyPr rtlCol="0" anchor="ctr"/>
-          <a:lstStyle/>
-          <a:p>
-            <a:pPr algn="ctr"/>
-            <a:r>
-              <a:rPr lang="en-US" dirty="0"/>
-              <a:t>2</a:t>
-            </a:r>
-          </a:p>
-        </p:txBody>
-      </p:sp>
     </p:spTree>
     <p:extLst>
       <p:ext uri="{BB962C8B-B14F-4D97-AF65-F5344CB8AC3E}">
@@ -7155,58 +7051,6 @@
       </p:sp>
       <p:sp>
         <p:nvSpPr>
-          <p:cNvPr id="7" name="Oval 6">
-            <a:extLst>
-              <a:ext uri="{FF2B5EF4-FFF2-40B4-BE49-F238E27FC236}">
-                <a16:creationId xmlns:a16="http://schemas.microsoft.com/office/drawing/2014/main" id="{2F4F4FFD-65C2-42EE-A82E-8C72727A7B62}"/>
-              </a:ext>
-            </a:extLst>
-          </p:cNvPr>
-          <p:cNvSpPr/>
-          <p:nvPr/>
-        </p:nvSpPr>
-        <p:spPr>
-          <a:xfrm>
-            <a:off x="665845" y="2027068"/>
-            <a:ext cx="287919" cy="298579"/>
-          </a:xfrm>
-          <a:prstGeom prst="ellipse">
-            <a:avLst/>
-          </a:prstGeom>
-          <a:solidFill>
-            <a:srgbClr val="FF0000"/>
-          </a:solidFill>
-        </p:spPr>
-        <p:style>
-          <a:lnRef idx="2">
-            <a:schemeClr val="accent1">
-              <a:shade val="50000"/>
-            </a:schemeClr>
-          </a:lnRef>
-          <a:fillRef idx="1">
-            <a:schemeClr val="accent1"/>
-          </a:fillRef>
-          <a:effectRef idx="0">
-            <a:schemeClr val="accent1"/>
-          </a:effectRef>
-          <a:fontRef idx="minor">
-            <a:schemeClr val="lt1"/>
-          </a:fontRef>
-        </p:style>
-        <p:txBody>
-          <a:bodyPr rtlCol="0" anchor="ctr"/>
-          <a:lstStyle/>
-          <a:p>
-            <a:pPr algn="ctr"/>
-            <a:r>
-              <a:rPr lang="en-US" dirty="0"/>
-              <a:t>3</a:t>
-            </a:r>
-          </a:p>
-        </p:txBody>
-      </p:sp>
-      <p:sp>
-        <p:nvSpPr>
           <p:cNvPr id="8" name="Callout: Right Arrow 7">
             <a:extLst>
               <a:ext uri="{FF2B5EF4-FFF2-40B4-BE49-F238E27FC236}">
@@ -7257,58 +7101,6 @@
             <a:r>
               <a:rPr lang="en-US" dirty="0"/>
               <a:t>To begin your project, click Minimize To Tray button.</a:t>
-            </a:r>
-          </a:p>
-        </p:txBody>
-      </p:sp>
-      <p:sp>
-        <p:nvSpPr>
-          <p:cNvPr id="9" name="Oval 8">
-            <a:extLst>
-              <a:ext uri="{FF2B5EF4-FFF2-40B4-BE49-F238E27FC236}">
-                <a16:creationId xmlns:a16="http://schemas.microsoft.com/office/drawing/2014/main" id="{BBDFC11F-1AD6-4E23-AB1F-471506CBFCCB}"/>
-              </a:ext>
-            </a:extLst>
-          </p:cNvPr>
-          <p:cNvSpPr/>
-          <p:nvPr/>
-        </p:nvSpPr>
-        <p:spPr>
-          <a:xfrm>
-            <a:off x="579581" y="4254759"/>
-            <a:ext cx="287919" cy="298579"/>
-          </a:xfrm>
-          <a:prstGeom prst="ellipse">
-            <a:avLst/>
-          </a:prstGeom>
-          <a:solidFill>
-            <a:srgbClr val="FF0000"/>
-          </a:solidFill>
-        </p:spPr>
-        <p:style>
-          <a:lnRef idx="2">
-            <a:schemeClr val="accent1">
-              <a:shade val="50000"/>
-            </a:schemeClr>
-          </a:lnRef>
-          <a:fillRef idx="1">
-            <a:schemeClr val="accent1"/>
-          </a:fillRef>
-          <a:effectRef idx="0">
-            <a:schemeClr val="accent1"/>
-          </a:effectRef>
-          <a:fontRef idx="minor">
-            <a:schemeClr val="lt1"/>
-          </a:fontRef>
-        </p:style>
-        <p:txBody>
-          <a:bodyPr rtlCol="0" anchor="ctr"/>
-          <a:lstStyle/>
-          <a:p>
-            <a:pPr algn="ctr"/>
-            <a:r>
-              <a:rPr lang="en-US" dirty="0"/>
-              <a:t>4</a:t>
             </a:r>
           </a:p>
         </p:txBody>
@@ -7536,58 +7328,6 @@
             <a:r>
               <a:rPr lang="en-US" dirty="0"/>
               <a:t>To add a textbox, go to the Properties bar and click the Add Textbox button.</a:t>
-            </a:r>
-          </a:p>
-        </p:txBody>
-      </p:sp>
-      <p:sp>
-        <p:nvSpPr>
-          <p:cNvPr id="7" name="Oval 6">
-            <a:extLst>
-              <a:ext uri="{FF2B5EF4-FFF2-40B4-BE49-F238E27FC236}">
-                <a16:creationId xmlns:a16="http://schemas.microsoft.com/office/drawing/2014/main" id="{394E497A-19CB-4FC9-A448-18DF2F993BDB}"/>
-              </a:ext>
-            </a:extLst>
-          </p:cNvPr>
-          <p:cNvSpPr/>
-          <p:nvPr/>
-        </p:nvSpPr>
-        <p:spPr>
-          <a:xfrm>
-            <a:off x="7745577" y="701337"/>
-            <a:ext cx="270959" cy="292962"/>
-          </a:xfrm>
-          <a:prstGeom prst="ellipse">
-            <a:avLst/>
-          </a:prstGeom>
-          <a:solidFill>
-            <a:srgbClr val="FF0000"/>
-          </a:solidFill>
-        </p:spPr>
-        <p:style>
-          <a:lnRef idx="2">
-            <a:schemeClr val="accent1">
-              <a:shade val="50000"/>
-            </a:schemeClr>
-          </a:lnRef>
-          <a:fillRef idx="1">
-            <a:schemeClr val="accent1"/>
-          </a:fillRef>
-          <a:effectRef idx="0">
-            <a:schemeClr val="accent1"/>
-          </a:effectRef>
-          <a:fontRef idx="minor">
-            <a:schemeClr val="lt1"/>
-          </a:fontRef>
-        </p:style>
-        <p:txBody>
-          <a:bodyPr rtlCol="0" anchor="ctr"/>
-          <a:lstStyle/>
-          <a:p>
-            <a:pPr algn="ctr"/>
-            <a:r>
-              <a:rPr lang="en-US" dirty="0"/>
-              <a:t>5</a:t>
             </a:r>
           </a:p>
         </p:txBody>

</xml_diff>